<commit_message>
More sprint 3 related documentation
</commit_message>
<xml_diff>
--- a/SUPER RESOLUTION A SPATIAL SUBPIXEL INTERPOLATION TECHNIQUE_sprint_3.pptx
+++ b/SUPER RESOLUTION A SPATIAL SUBPIXEL INTERPOLATION TECHNIQUE_sprint_3.pptx
@@ -9156,6 +9156,13 @@
   <p:clrMapOvr>
     <a:masterClrMapping/>
   </p:clrMapOvr>
+  <p:timing>
+    <p:tnLst>
+      <p:par>
+        <p:cTn id="1" dur="indefinite" restart="never" nodeType="tmRoot"/>
+      </p:par>
+    </p:tnLst>
+  </p:timing>
 </p:sld>
 </file>
 
@@ -9232,7 +9239,6 @@
               <a:rPr lang="ro-RO" dirty="0" smtClean="0"/>
               <a:t>ETAPA CURENTĂ</a:t>
             </a:r>
-            <a:endParaRPr lang="ro-RO" dirty="0" smtClean="0"/>
           </a:p>
           <a:p>
             <a:endParaRPr lang="en-US" dirty="0" smtClean="0"/>
@@ -9279,6 +9285,13 @@
   <p:clrMapOvr>
     <a:masterClrMapping/>
   </p:clrMapOvr>
+  <p:timing>
+    <p:tnLst>
+      <p:par>
+        <p:cTn id="1" dur="indefinite" restart="never" nodeType="tmRoot"/>
+      </p:par>
+    </p:tnLst>
+  </p:timing>
 </p:sld>
 </file>
 
@@ -9781,6 +9794,13 @@
   <p:clrMapOvr>
     <a:masterClrMapping/>
   </p:clrMapOvr>
+  <p:timing>
+    <p:tnLst>
+      <p:par>
+        <p:cTn id="1" dur="indefinite" restart="never" nodeType="tmRoot"/>
+      </p:par>
+    </p:tnLst>
+  </p:timing>
 </p:sld>
 </file>
 
@@ -9942,6 +9962,13 @@
   <p:clrMapOvr>
     <a:masterClrMapping/>
   </p:clrMapOvr>
+  <p:timing>
+    <p:tnLst>
+      <p:par>
+        <p:cTn id="1" dur="indefinite" restart="never" nodeType="tmRoot"/>
+      </p:par>
+    </p:tnLst>
+  </p:timing>
 </p:sld>
 </file>
 
@@ -9989,25 +10016,70 @@
           </a:p>
         </p:txBody>
       </p:sp>
-      <p:sp>
-        <p:nvSpPr>
-          <p:cNvPr id="3" name="Content Placeholder 2"/>
-          <p:cNvSpPr>
-            <a:spLocks noGrp="1"/>
-          </p:cNvSpPr>
+      <p:pic>
+        <p:nvPicPr>
+          <p:cNvPr id="7" name="video-1608135774">
+            <a:hlinkClick r:id="" action="ppaction://media"/>
+          </p:cNvPr>
+          <p:cNvPicPr>
+            <a:picLocks noGrp="1" noChangeAspect="1"/>
+          </p:cNvPicPr>
           <p:nvPr>
             <p:ph idx="1"/>
+            <a:videoFile r:link="rId2"/>
+            <p:extLst>
+              <p:ext uri="{DAA4B4D4-6D71-4841-9C94-3DE7FCFB9230}">
+                <p14:media xmlns:p14="http://schemas.microsoft.com/office/powerpoint/2010/main" r:embed="rId1"/>
+              </p:ext>
+            </p:extLst>
           </p:nvPr>
-        </p:nvSpPr>
-        <p:spPr/>
-        <p:txBody>
-          <a:bodyPr/>
-          <a:lstStyle/>
-          <a:p>
-            <a:endParaRPr lang="en-US"/>
-          </a:p>
-        </p:txBody>
-      </p:sp>
+        </p:nvPicPr>
+        <p:blipFill>
+          <a:blip r:embed="rId6"/>
+          <a:stretch>
+            <a:fillRect/>
+          </a:stretch>
+        </p:blipFill>
+        <p:spPr>
+          <a:xfrm>
+            <a:off x="461203" y="2236345"/>
+            <a:ext cx="5490710" cy="3157287"/>
+          </a:xfrm>
+        </p:spPr>
+      </p:pic>
+      <p:pic>
+        <p:nvPicPr>
+          <p:cNvPr id="8" name="video-1608135782">
+            <a:hlinkClick r:id="" action="ppaction://media"/>
+          </p:cNvPr>
+          <p:cNvPicPr>
+            <a:picLocks noChangeAspect="1"/>
+          </p:cNvPicPr>
+          <p:nvPr>
+            <a:videoFile r:link="rId4"/>
+            <p:extLst>
+              <p:ext uri="{DAA4B4D4-6D71-4841-9C94-3DE7FCFB9230}">
+                <p14:media xmlns:p14="http://schemas.microsoft.com/office/powerpoint/2010/main" r:embed="rId3"/>
+              </p:ext>
+            </p:extLst>
+          </p:nvPr>
+        </p:nvPicPr>
+        <p:blipFill>
+          <a:blip r:embed="rId7"/>
+          <a:stretch>
+            <a:fillRect/>
+          </a:stretch>
+        </p:blipFill>
+        <p:spPr>
+          <a:xfrm>
+            <a:off x="6334299" y="2236345"/>
+            <a:ext cx="5541818" cy="3156731"/>
+          </a:xfrm>
+          <a:prstGeom prst="rect">
+            <a:avLst/>
+          </a:prstGeom>
+        </p:spPr>
+      </p:pic>
     </p:spTree>
     <p:extLst>
       <p:ext uri="{BB962C8B-B14F-4D97-AF65-F5344CB8AC3E}">
@@ -10018,6 +10090,115 @@
   <p:clrMapOvr>
     <a:masterClrMapping/>
   </p:clrMapOvr>
+  <p:timing>
+    <p:tnLst>
+      <p:par>
+        <p:cTn id="1" dur="indefinite" restart="never" nodeType="tmRoot">
+          <p:childTnLst>
+            <p:video>
+              <p:cMediaNode vol="80000">
+                <p:cTn id="2" fill="hold" display="0">
+                  <p:stCondLst>
+                    <p:cond delay="indefinite"/>
+                  </p:stCondLst>
+                </p:cTn>
+                <p:tgtEl>
+                  <p:spTgt spid="7"/>
+                </p:tgtEl>
+              </p:cMediaNode>
+            </p:video>
+            <p:video>
+              <p:cMediaNode vol="80000">
+                <p:cTn id="3" fill="hold" display="0">
+                  <p:stCondLst>
+                    <p:cond delay="indefinite"/>
+                  </p:stCondLst>
+                </p:cTn>
+                <p:tgtEl>
+                  <p:spTgt spid="8"/>
+                </p:tgtEl>
+              </p:cMediaNode>
+            </p:video>
+            <p:seq concurrent="1" nextAc="seek">
+              <p:cTn id="4" restart="whenNotActive" fill="hold" evtFilter="cancelBubble" nodeType="interactiveSeq">
+                <p:stCondLst>
+                  <p:cond evt="onClick" delay="0">
+                    <p:tgtEl>
+                      <p:spTgt spid="7"/>
+                    </p:tgtEl>
+                  </p:cond>
+                </p:stCondLst>
+                <p:endSync evt="end" delay="0">
+                  <p:rtn val="all"/>
+                </p:endSync>
+                <p:childTnLst>
+                  <p:par>
+                    <p:cTn id="5" fill="hold">
+                      <p:stCondLst>
+                        <p:cond delay="0"/>
+                      </p:stCondLst>
+                      <p:childTnLst>
+                        <p:par>
+                          <p:cTn id="6" fill="hold">
+                            <p:stCondLst>
+                              <p:cond delay="0"/>
+                            </p:stCondLst>
+                            <p:childTnLst>
+                              <p:par>
+                                <p:cTn id="7" presetID="1" presetClass="mediacall" presetSubtype="0" fill="hold" nodeType="clickEffect">
+                                  <p:stCondLst>
+                                    <p:cond delay="0"/>
+                                  </p:stCondLst>
+                                  <p:childTnLst>
+                                    <p:cmd type="call" cmd="playFrom(0.0)">
+                                      <p:cBhvr>
+                                        <p:cTn id="8" dur="8939" fill="hold"/>
+                                        <p:tgtEl>
+                                          <p:spTgt spid="7"/>
+                                        </p:tgtEl>
+                                      </p:cBhvr>
+                                    </p:cmd>
+                                  </p:childTnLst>
+                                </p:cTn>
+                              </p:par>
+                              <p:par>
+                                <p:cTn id="9" presetID="1" presetClass="mediacall" presetSubtype="0" fill="hold" nodeType="withEffect">
+                                  <p:stCondLst>
+                                    <p:cond delay="0"/>
+                                  </p:stCondLst>
+                                  <p:childTnLst>
+                                    <p:cmd type="call" cmd="playFrom(0.0)">
+                                      <p:cBhvr>
+                                        <p:cTn id="10" dur="10667" fill="hold"/>
+                                        <p:tgtEl>
+                                          <p:spTgt spid="8"/>
+                                        </p:tgtEl>
+                                      </p:cBhvr>
+                                    </p:cmd>
+                                  </p:childTnLst>
+                                </p:cTn>
+                              </p:par>
+                            </p:childTnLst>
+                          </p:cTn>
+                        </p:par>
+                      </p:childTnLst>
+                    </p:cTn>
+                  </p:par>
+                </p:childTnLst>
+              </p:cTn>
+              <p:nextCondLst>
+                <p:cond evt="onClick" delay="0">
+                  <p:tgtEl>
+                    <p:spTgt spid="7"/>
+                  </p:tgtEl>
+                </p:cond>
+              </p:nextCondLst>
+            </p:seq>
+          </p:childTnLst>
+        </p:cTn>
+      </p:par>
+    </p:tnLst>
+  </p:timing>
 </p:sld>
 </file>
 
@@ -10096,6 +10277,13 @@
   <p:clrMapOvr>
     <a:masterClrMapping/>
   </p:clrMapOvr>
+  <p:timing>
+    <p:tnLst>
+      <p:par>
+        <p:cTn id="1" dur="indefinite" restart="never" nodeType="tmRoot"/>
+      </p:par>
+    </p:tnLst>
+  </p:timing>
 </p:sld>
 </file>
 
@@ -10181,6 +10369,13 @@
   <p:clrMapOvr>
     <a:masterClrMapping/>
   </p:clrMapOvr>
+  <p:timing>
+    <p:tnLst>
+      <p:par>
+        <p:cTn id="1" dur="indefinite" restart="never" nodeType="tmRoot"/>
+      </p:par>
+    </p:tnLst>
+  </p:timing>
 </p:sld>
 </file>
 

</xml_diff>